<commit_message>
graficas y modificaciones al ppt
</commit_message>
<xml_diff>
--- a/doc/avance-parcial.pptx
+++ b/doc/avance-parcial.pptx
@@ -219,7 +219,7 @@
           <a:p>
             <a:fld id="{BB9346E9-93C1-459F-8777-3C1ED310C911}" type="datetimeFigureOut">
               <a:rPr lang="es-PE" smtClean="0"/>
-              <a:t>23/04/2019</a:t>
+              <a:t>28/04/2019</a:t>
             </a:fld>
             <a:endParaRPr lang="es-PE" dirty="0"/>
           </a:p>
@@ -668,7 +668,7 @@
           <a:p>
             <a:fld id="{0DEFF730-B349-4C0E-AEB7-A7A6ECC56BB4}" type="datetimeFigureOut">
               <a:rPr lang="es-PE" smtClean="0"/>
-              <a:t>23/04/2019</a:t>
+              <a:t>28/04/2019</a:t>
             </a:fld>
             <a:endParaRPr lang="es-PE" dirty="0"/>
           </a:p>
@@ -936,7 +936,7 @@
           <a:p>
             <a:fld id="{0DEFF730-B349-4C0E-AEB7-A7A6ECC56BB4}" type="datetimeFigureOut">
               <a:rPr lang="es-PE" smtClean="0"/>
-              <a:t>23/04/2019</a:t>
+              <a:t>28/04/2019</a:t>
             </a:fld>
             <a:endParaRPr lang="es-PE" dirty="0"/>
           </a:p>
@@ -1114,7 +1114,7 @@
           <a:p>
             <a:fld id="{0DEFF730-B349-4C0E-AEB7-A7A6ECC56BB4}" type="datetimeFigureOut">
               <a:rPr lang="es-PE" smtClean="0"/>
-              <a:t>23/04/2019</a:t>
+              <a:t>28/04/2019</a:t>
             </a:fld>
             <a:endParaRPr lang="es-PE" dirty="0"/>
           </a:p>
@@ -1302,7 +1302,7 @@
           <a:p>
             <a:fld id="{0DEFF730-B349-4C0E-AEB7-A7A6ECC56BB4}" type="datetimeFigureOut">
               <a:rPr lang="es-PE" smtClean="0"/>
-              <a:t>23/04/2019</a:t>
+              <a:t>28/04/2019</a:t>
             </a:fld>
             <a:endParaRPr lang="es-PE" dirty="0"/>
           </a:p>
@@ -1685,7 +1685,7 @@
           <a:p>
             <a:fld id="{B386EE55-916B-457E-BD9C-C9E952A5FBDC}" type="datetimeFigureOut">
               <a:rPr lang="es-PE" smtClean="0"/>
-              <a:t>23/04/2019</a:t>
+              <a:t>28/04/2019</a:t>
             </a:fld>
             <a:endParaRPr lang="es-PE" dirty="0"/>
           </a:p>
@@ -1863,7 +1863,7 @@
           <a:p>
             <a:fld id="{B386EE55-916B-457E-BD9C-C9E952A5FBDC}" type="datetimeFigureOut">
               <a:rPr lang="es-PE" smtClean="0"/>
-              <a:t>23/04/2019</a:t>
+              <a:t>28/04/2019</a:t>
             </a:fld>
             <a:endParaRPr lang="es-PE" dirty="0"/>
           </a:p>
@@ -2117,7 +2117,7 @@
           <a:p>
             <a:fld id="{B386EE55-916B-457E-BD9C-C9E952A5FBDC}" type="datetimeFigureOut">
               <a:rPr lang="es-PE" smtClean="0"/>
-              <a:t>23/04/2019</a:t>
+              <a:t>28/04/2019</a:t>
             </a:fld>
             <a:endParaRPr lang="es-PE" dirty="0"/>
           </a:p>
@@ -2413,7 +2413,7 @@
           <a:p>
             <a:fld id="{B386EE55-916B-457E-BD9C-C9E952A5FBDC}" type="datetimeFigureOut">
               <a:rPr lang="es-PE" smtClean="0"/>
-              <a:t>23/04/2019</a:t>
+              <a:t>28/04/2019</a:t>
             </a:fld>
             <a:endParaRPr lang="es-PE" dirty="0"/>
           </a:p>
@@ -2843,7 +2843,7 @@
           <a:p>
             <a:fld id="{B386EE55-916B-457E-BD9C-C9E952A5FBDC}" type="datetimeFigureOut">
               <a:rPr lang="es-PE" smtClean="0"/>
-              <a:t>23/04/2019</a:t>
+              <a:t>28/04/2019</a:t>
             </a:fld>
             <a:endParaRPr lang="es-PE" dirty="0"/>
           </a:p>
@@ -2969,7 +2969,7 @@
           <a:p>
             <a:fld id="{B386EE55-916B-457E-BD9C-C9E952A5FBDC}" type="datetimeFigureOut">
               <a:rPr lang="es-PE" smtClean="0"/>
-              <a:t>23/04/2019</a:t>
+              <a:t>28/04/2019</a:t>
             </a:fld>
             <a:endParaRPr lang="es-PE" dirty="0"/>
           </a:p>
@@ -3095,7 +3095,7 @@
           <a:p>
             <a:fld id="{0DEFF730-B349-4C0E-AEB7-A7A6ECC56BB4}" type="datetimeFigureOut">
               <a:rPr lang="es-PE" smtClean="0"/>
-              <a:t>23/04/2019</a:t>
+              <a:t>28/04/2019</a:t>
             </a:fld>
             <a:endParaRPr lang="es-PE" dirty="0"/>
           </a:p>
@@ -3198,7 +3198,7 @@
           <a:p>
             <a:fld id="{B386EE55-916B-457E-BD9C-C9E952A5FBDC}" type="datetimeFigureOut">
               <a:rPr lang="es-PE" smtClean="0"/>
-              <a:t>23/04/2019</a:t>
+              <a:t>28/04/2019</a:t>
             </a:fld>
             <a:endParaRPr lang="es-PE" dirty="0"/>
           </a:p>
@@ -3483,7 +3483,7 @@
           <a:p>
             <a:fld id="{B386EE55-916B-457E-BD9C-C9E952A5FBDC}" type="datetimeFigureOut">
               <a:rPr lang="es-PE" smtClean="0"/>
-              <a:t>23/04/2019</a:t>
+              <a:t>28/04/2019</a:t>
             </a:fld>
             <a:endParaRPr lang="es-PE" dirty="0"/>
           </a:p>
@@ -3744,7 +3744,7 @@
           <a:p>
             <a:fld id="{B386EE55-916B-457E-BD9C-C9E952A5FBDC}" type="datetimeFigureOut">
               <a:rPr lang="es-PE" smtClean="0"/>
-              <a:t>23/04/2019</a:t>
+              <a:t>28/04/2019</a:t>
             </a:fld>
             <a:endParaRPr lang="es-PE" dirty="0"/>
           </a:p>
@@ -3922,7 +3922,7 @@
           <a:p>
             <a:fld id="{B386EE55-916B-457E-BD9C-C9E952A5FBDC}" type="datetimeFigureOut">
               <a:rPr lang="es-PE" smtClean="0"/>
-              <a:t>23/04/2019</a:t>
+              <a:t>28/04/2019</a:t>
             </a:fld>
             <a:endParaRPr lang="es-PE" dirty="0"/>
           </a:p>
@@ -4110,7 +4110,7 @@
           <a:p>
             <a:fld id="{B386EE55-916B-457E-BD9C-C9E952A5FBDC}" type="datetimeFigureOut">
               <a:rPr lang="es-PE" smtClean="0"/>
-              <a:t>23/04/2019</a:t>
+              <a:t>28/04/2019</a:t>
             </a:fld>
             <a:endParaRPr lang="es-PE" dirty="0"/>
           </a:p>
@@ -4360,7 +4360,7 @@
           <a:p>
             <a:fld id="{5672C329-FB15-46FD-B671-6C7B203CB9AB}" type="datetimeFigureOut">
               <a:rPr lang="es-PE" smtClean="0"/>
-              <a:t>23/04/2019</a:t>
+              <a:t>28/04/2019</a:t>
             </a:fld>
             <a:endParaRPr lang="es-PE" dirty="0"/>
           </a:p>
@@ -4538,7 +4538,7 @@
           <a:p>
             <a:fld id="{5672C329-FB15-46FD-B671-6C7B203CB9AB}" type="datetimeFigureOut">
               <a:rPr lang="es-PE" smtClean="0"/>
-              <a:t>23/04/2019</a:t>
+              <a:t>28/04/2019</a:t>
             </a:fld>
             <a:endParaRPr lang="es-PE" dirty="0"/>
           </a:p>
@@ -4792,7 +4792,7 @@
           <a:p>
             <a:fld id="{5672C329-FB15-46FD-B671-6C7B203CB9AB}" type="datetimeFigureOut">
               <a:rPr lang="es-PE" smtClean="0"/>
-              <a:t>23/04/2019</a:t>
+              <a:t>28/04/2019</a:t>
             </a:fld>
             <a:endParaRPr lang="es-PE" dirty="0"/>
           </a:p>
@@ -5088,7 +5088,7 @@
           <a:p>
             <a:fld id="{5672C329-FB15-46FD-B671-6C7B203CB9AB}" type="datetimeFigureOut">
               <a:rPr lang="es-PE" smtClean="0"/>
-              <a:t>23/04/2019</a:t>
+              <a:t>28/04/2019</a:t>
             </a:fld>
             <a:endParaRPr lang="es-PE" dirty="0"/>
           </a:p>
@@ -5518,7 +5518,7 @@
           <a:p>
             <a:fld id="{5672C329-FB15-46FD-B671-6C7B203CB9AB}" type="datetimeFigureOut">
               <a:rPr lang="es-PE" smtClean="0"/>
-              <a:t>23/04/2019</a:t>
+              <a:t>28/04/2019</a:t>
             </a:fld>
             <a:endParaRPr lang="es-PE" dirty="0"/>
           </a:p>
@@ -5696,7 +5696,7 @@
           <a:p>
             <a:fld id="{0DEFF730-B349-4C0E-AEB7-A7A6ECC56BB4}" type="datetimeFigureOut">
               <a:rPr lang="es-PE" smtClean="0"/>
-              <a:t>23/04/2019</a:t>
+              <a:t>28/04/2019</a:t>
             </a:fld>
             <a:endParaRPr lang="es-PE" dirty="0"/>
           </a:p>
@@ -5822,7 +5822,7 @@
           <a:p>
             <a:fld id="{5672C329-FB15-46FD-B671-6C7B203CB9AB}" type="datetimeFigureOut">
               <a:rPr lang="es-PE" smtClean="0"/>
-              <a:t>23/04/2019</a:t>
+              <a:t>28/04/2019</a:t>
             </a:fld>
             <a:endParaRPr lang="es-PE" dirty="0"/>
           </a:p>
@@ -5925,7 +5925,7 @@
           <a:p>
             <a:fld id="{5672C329-FB15-46FD-B671-6C7B203CB9AB}" type="datetimeFigureOut">
               <a:rPr lang="es-PE" smtClean="0"/>
-              <a:t>23/04/2019</a:t>
+              <a:t>28/04/2019</a:t>
             </a:fld>
             <a:endParaRPr lang="es-PE" dirty="0"/>
           </a:p>
@@ -6210,7 +6210,7 @@
           <a:p>
             <a:fld id="{5672C329-FB15-46FD-B671-6C7B203CB9AB}" type="datetimeFigureOut">
               <a:rPr lang="es-PE" smtClean="0"/>
-              <a:t>23/04/2019</a:t>
+              <a:t>28/04/2019</a:t>
             </a:fld>
             <a:endParaRPr lang="es-PE" dirty="0"/>
           </a:p>
@@ -6471,7 +6471,7 @@
           <a:p>
             <a:fld id="{5672C329-FB15-46FD-B671-6C7B203CB9AB}" type="datetimeFigureOut">
               <a:rPr lang="es-PE" smtClean="0"/>
-              <a:t>23/04/2019</a:t>
+              <a:t>28/04/2019</a:t>
             </a:fld>
             <a:endParaRPr lang="es-PE" dirty="0"/>
           </a:p>
@@ -6649,7 +6649,7 @@
           <a:p>
             <a:fld id="{5672C329-FB15-46FD-B671-6C7B203CB9AB}" type="datetimeFigureOut">
               <a:rPr lang="es-PE" smtClean="0"/>
-              <a:t>23/04/2019</a:t>
+              <a:t>28/04/2019</a:t>
             </a:fld>
             <a:endParaRPr lang="es-PE" dirty="0"/>
           </a:p>
@@ -6837,7 +6837,7 @@
           <a:p>
             <a:fld id="{5672C329-FB15-46FD-B671-6C7B203CB9AB}" type="datetimeFigureOut">
               <a:rPr lang="es-PE" smtClean="0"/>
-              <a:t>23/04/2019</a:t>
+              <a:t>28/04/2019</a:t>
             </a:fld>
             <a:endParaRPr lang="es-PE" dirty="0"/>
           </a:p>
@@ -7091,7 +7091,7 @@
           <a:p>
             <a:fld id="{0DEFF730-B349-4C0E-AEB7-A7A6ECC56BB4}" type="datetimeFigureOut">
               <a:rPr lang="es-PE" smtClean="0"/>
-              <a:t>23/04/2019</a:t>
+              <a:t>28/04/2019</a:t>
             </a:fld>
             <a:endParaRPr lang="es-PE" dirty="0"/>
           </a:p>
@@ -7387,7 +7387,7 @@
           <a:p>
             <a:fld id="{0DEFF730-B349-4C0E-AEB7-A7A6ECC56BB4}" type="datetimeFigureOut">
               <a:rPr lang="es-PE" smtClean="0"/>
-              <a:t>23/04/2019</a:t>
+              <a:t>28/04/2019</a:t>
             </a:fld>
             <a:endParaRPr lang="es-PE" dirty="0"/>
           </a:p>
@@ -7817,7 +7817,7 @@
           <a:p>
             <a:fld id="{0DEFF730-B349-4C0E-AEB7-A7A6ECC56BB4}" type="datetimeFigureOut">
               <a:rPr lang="es-PE" smtClean="0"/>
-              <a:t>23/04/2019</a:t>
+              <a:t>28/04/2019</a:t>
             </a:fld>
             <a:endParaRPr lang="es-PE" dirty="0"/>
           </a:p>
@@ -7943,7 +7943,7 @@
           <a:p>
             <a:fld id="{0DEFF730-B349-4C0E-AEB7-A7A6ECC56BB4}" type="datetimeFigureOut">
               <a:rPr lang="es-PE" smtClean="0"/>
-              <a:t>23/04/2019</a:t>
+              <a:t>28/04/2019</a:t>
             </a:fld>
             <a:endParaRPr lang="es-PE" dirty="0"/>
           </a:p>
@@ -8046,7 +8046,7 @@
           <a:p>
             <a:fld id="{0DEFF730-B349-4C0E-AEB7-A7A6ECC56BB4}" type="datetimeFigureOut">
               <a:rPr lang="es-PE" smtClean="0"/>
-              <a:t>23/04/2019</a:t>
+              <a:t>28/04/2019</a:t>
             </a:fld>
             <a:endParaRPr lang="es-PE" dirty="0"/>
           </a:p>
@@ -8331,7 +8331,7 @@
           <a:p>
             <a:fld id="{0DEFF730-B349-4C0E-AEB7-A7A6ECC56BB4}" type="datetimeFigureOut">
               <a:rPr lang="es-PE" smtClean="0"/>
-              <a:t>23/04/2019</a:t>
+              <a:t>28/04/2019</a:t>
             </a:fld>
             <a:endParaRPr lang="es-PE" dirty="0"/>
           </a:p>
@@ -8552,7 +8552,7 @@
           <a:p>
             <a:fld id="{0DEFF730-B349-4C0E-AEB7-A7A6ECC56BB4}" type="datetimeFigureOut">
               <a:rPr lang="es-PE" smtClean="0"/>
-              <a:t>23/04/2019</a:t>
+              <a:t>28/04/2019</a:t>
             </a:fld>
             <a:endParaRPr lang="es-PE" dirty="0"/>
           </a:p>
@@ -9072,7 +9072,7 @@
           <a:p>
             <a:fld id="{B386EE55-916B-457E-BD9C-C9E952A5FBDC}" type="datetimeFigureOut">
               <a:rPr lang="es-PE" smtClean="0"/>
-              <a:t>23/04/2019</a:t>
+              <a:t>28/04/2019</a:t>
             </a:fld>
             <a:endParaRPr lang="es-PE" dirty="0"/>
           </a:p>
@@ -9590,7 +9590,7 @@
           <a:p>
             <a:fld id="{5672C329-FB15-46FD-B671-6C7B203CB9AB}" type="datetimeFigureOut">
               <a:rPr lang="es-PE" smtClean="0"/>
-              <a:t>23/04/2019</a:t>
+              <a:t>28/04/2019</a:t>
             </a:fld>
             <a:endParaRPr lang="es-PE" dirty="0"/>
           </a:p>
@@ -10529,8 +10529,8 @@
           </a:p>
         </p:txBody>
       </p:sp>
-      <mc:AlternateContent xmlns:mc="http://schemas.openxmlformats.org/markup-compatibility/2006">
-        <mc:Choice xmlns:a14="http://schemas.microsoft.com/office/drawing/2010/main" Requires="a14">
+      <mc:AlternateContent xmlns:mc="http://schemas.openxmlformats.org/markup-compatibility/2006" xmlns:a14="http://schemas.microsoft.com/office/drawing/2010/main">
+        <mc:Choice Requires="a14">
           <p:sp>
             <p:nvSpPr>
               <p:cNvPr id="2" name="Rectángulo 1"/>
@@ -10552,6 +10552,7 @@
               </a:bodyPr>
               <a:lstStyle/>
               <a:p>
+                <a:pPr/>
                 <a14:m>
                   <m:oMathPara xmlns:m="http://schemas.openxmlformats.org/officeDocument/2006/math">
                     <m:oMathParaPr>
@@ -10561,7 +10562,7 @@
                       <m:sSubSup>
                         <m:sSubSupPr>
                           <m:ctrlPr>
-                            <a:rPr lang="en-US" sz="1400" smtClean="0">
+                            <a:rPr lang="en-US" sz="1400" i="1" smtClean="0">
                               <a:latin typeface="Cambria Math" panose="02040503050406030204" pitchFamily="18" charset="0"/>
                             </a:rPr>
                           </m:ctrlPr>
@@ -10946,6 +10947,7 @@
                 </a:endParaRPr>
               </a:p>
               <a:p>
+                <a:pPr/>
                 <a14:m>
                   <m:oMathPara xmlns:m="http://schemas.openxmlformats.org/officeDocument/2006/math">
                     <m:oMathParaPr>
@@ -11340,7 +11342,7 @@
             </p:txBody>
           </p:sp>
         </mc:Choice>
-        <mc:Fallback>
+        <mc:Fallback xmlns="">
           <p:sp>
             <p:nvSpPr>
               <p:cNvPr id="2" name="Rectángulo 1"/>
@@ -11379,6 +11381,36 @@
           </p:sp>
         </mc:Fallback>
       </mc:AlternateContent>
+      <p:pic>
+        <p:nvPicPr>
+          <p:cNvPr id="7" name="Imagen 6"/>
+          <p:cNvPicPr>
+            <a:picLocks noChangeAspect="1"/>
+          </p:cNvPicPr>
+          <p:nvPr/>
+        </p:nvPicPr>
+        <p:blipFill>
+          <a:blip r:embed="rId3">
+            <a:extLst>
+              <a:ext uri="{28A0092B-C50C-407E-A947-70E740481C1C}">
+                <a14:useLocalDpi xmlns:a14="http://schemas.microsoft.com/office/drawing/2010/main" val="0"/>
+              </a:ext>
+            </a:extLst>
+          </a:blip>
+          <a:stretch>
+            <a:fillRect/>
+          </a:stretch>
+        </p:blipFill>
+        <p:spPr>
+          <a:xfrm>
+            <a:off x="3672000" y="3249000"/>
+            <a:ext cx="3960000" cy="3544949"/>
+          </a:xfrm>
+          <a:prstGeom prst="rect">
+            <a:avLst/>
+          </a:prstGeom>
+        </p:spPr>
+      </p:pic>
     </p:spTree>
     <p:extLst>
       <p:ext uri="{BB962C8B-B14F-4D97-AF65-F5344CB8AC3E}">
@@ -12527,8 +12559,8 @@
           </a:prstGeom>
         </p:spPr>
       </p:pic>
-      <mc:AlternateContent xmlns:mc="http://schemas.openxmlformats.org/markup-compatibility/2006">
-        <mc:Choice xmlns:a14="http://schemas.microsoft.com/office/drawing/2010/main" Requires="a14">
+      <mc:AlternateContent xmlns:mc="http://schemas.openxmlformats.org/markup-compatibility/2006" xmlns:a14="http://schemas.microsoft.com/office/drawing/2010/main">
+        <mc:Choice Requires="a14">
           <p:sp>
             <p:nvSpPr>
               <p:cNvPr id="10" name="CuadroTexto 9"/>
@@ -12551,6 +12583,7 @@
               </a:bodyPr>
               <a:lstStyle/>
               <a:p>
+                <a:pPr/>
                 <a14:m>
                   <m:oMathPara xmlns:m="http://schemas.openxmlformats.org/officeDocument/2006/math">
                     <m:oMathParaPr>
@@ -13046,7 +13079,7 @@
             </p:txBody>
           </p:sp>
         </mc:Choice>
-        <mc:Fallback>
+        <mc:Fallback xmlns="">
           <p:sp>
             <p:nvSpPr>
               <p:cNvPr id="10" name="CuadroTexto 9"/>
@@ -18789,7 +18822,7 @@
       </p:sp>
       <p:pic>
         <p:nvPicPr>
-          <p:cNvPr id="3" name="Imagen 2"/>
+          <p:cNvPr id="8" name="Imagen 7"/>
           <p:cNvPicPr>
             <a:picLocks noChangeAspect="1"/>
           </p:cNvPicPr>
@@ -18797,30 +18830,6 @@
         </p:nvPicPr>
         <p:blipFill>
           <a:blip r:embed="rId2"/>
-          <a:stretch>
-            <a:fillRect/>
-          </a:stretch>
-        </p:blipFill>
-        <p:spPr>
-          <a:xfrm>
-            <a:off x="2878905" y="5589000"/>
-            <a:ext cx="5276190" cy="771429"/>
-          </a:xfrm>
-          <a:prstGeom prst="rect">
-            <a:avLst/>
-          </a:prstGeom>
-        </p:spPr>
-      </p:pic>
-      <p:pic>
-        <p:nvPicPr>
-          <p:cNvPr id="8" name="Imagen 7"/>
-          <p:cNvPicPr>
-            <a:picLocks noChangeAspect="1"/>
-          </p:cNvPicPr>
-          <p:nvPr/>
-        </p:nvPicPr>
-        <p:blipFill>
-          <a:blip r:embed="rId3"/>
           <a:stretch>
             <a:fillRect/>
           </a:stretch>
@@ -23688,21 +23697,7 @@
                 <a:latin typeface="Arial" panose="020B0604020202020204" pitchFamily="34" charset="0"/>
                 <a:cs typeface="Arial" panose="020B0604020202020204" pitchFamily="34" charset="0"/>
               </a:rPr>
-              <a:t>¿Producto homogéneo? </a:t>
-            </a:r>
-            <a:r>
-              <a:rPr lang="es-PE" dirty="0" smtClean="0">
-                <a:latin typeface="Arial" panose="020B0604020202020204" pitchFamily="34" charset="0"/>
-                <a:cs typeface="Arial" panose="020B0604020202020204" pitchFamily="34" charset="0"/>
-              </a:rPr>
-              <a:t>← Calidad </a:t>
-            </a:r>
-            <a:r>
-              <a:rPr lang="es-PE" dirty="0" smtClean="0">
-                <a:latin typeface="Arial" panose="020B0604020202020204" pitchFamily="34" charset="0"/>
-                <a:cs typeface="Arial" panose="020B0604020202020204" pitchFamily="34" charset="0"/>
-              </a:rPr>
-              <a:t>regulada por el Estado</a:t>
+              <a:t>¿Producto homogéneo? ← Calidad regulada por el Estado</a:t>
             </a:r>
           </a:p>
           <a:p>
@@ -24104,14 +24099,7 @@
                 <a:latin typeface="Arial" panose="020B0604020202020204" pitchFamily="34" charset="0"/>
                 <a:cs typeface="Arial" panose="020B0604020202020204" pitchFamily="34" charset="0"/>
               </a:rPr>
-              <a:t>Determinar </a:t>
-            </a:r>
-            <a:r>
-              <a:rPr lang="es-PE" dirty="0" smtClean="0">
-                <a:latin typeface="Arial" panose="020B0604020202020204" pitchFamily="34" charset="0"/>
-                <a:cs typeface="Arial" panose="020B0604020202020204" pitchFamily="34" charset="0"/>
-              </a:rPr>
-              <a:t>el efecto que tiene una adquisición que consolida el mercado minorista en el precio de los combustibles cuando las características observables se mantienen constantes.</a:t>
+              <a:t>Determinar el efecto que tiene una adquisición que consolida el mercado minorista en el precio de los combustibles cuando las características observables se mantienen constantes.</a:t>
             </a:r>
             <a:endParaRPr lang="es-PE" dirty="0">
               <a:latin typeface="Arial" panose="020B0604020202020204" pitchFamily="34" charset="0"/>
@@ -26916,8 +26904,8 @@
           </a:p>
         </p:txBody>
       </p:sp>
-      <mc:AlternateContent xmlns:mc="http://schemas.openxmlformats.org/markup-compatibility/2006">
-        <mc:Choice xmlns:a14="http://schemas.microsoft.com/office/drawing/2010/main" Requires="a14">
+      <mc:AlternateContent xmlns:mc="http://schemas.openxmlformats.org/markup-compatibility/2006" xmlns:a14="http://schemas.microsoft.com/office/drawing/2010/main">
+        <mc:Choice Requires="a14">
           <p:sp>
             <p:nvSpPr>
               <p:cNvPr id="17" name="CuadroTexto 16"/>
@@ -26969,64 +26957,86 @@
                     <m:sSub>
                       <m:sSubPr>
                         <m:ctrlPr>
-                          <a:rPr lang="en-US" i="1"/>
+                          <a:rPr lang="en-US" i="1">
+                            <a:latin typeface="Cambria Math" panose="02040503050406030204" pitchFamily="18" charset="0"/>
+                          </a:rPr>
                         </m:ctrlPr>
                       </m:sSubPr>
                       <m:e>
                         <m:r>
-                          <a:rPr lang="es-PE" i="1"/>
+                          <a:rPr lang="es-PE" i="1">
+                            <a:latin typeface="Cambria Math" panose="02040503050406030204" pitchFamily="18" charset="0"/>
+                          </a:rPr>
                           <m:t>𝑄</m:t>
                         </m:r>
                       </m:e>
                       <m:sub>
                         <m:r>
-                          <a:rPr lang="es-PE" i="1" smtClean="0"/>
+                          <a:rPr lang="es-PE" i="1" smtClean="0">
+                            <a:latin typeface="Cambria Math" panose="02040503050406030204" pitchFamily="18" charset="0"/>
+                          </a:rPr>
                           <m:t>𝑎</m:t>
                         </m:r>
                       </m:sub>
                     </m:sSub>
                     <m:r>
-                      <a:rPr lang="es-PE" i="1"/>
+                      <a:rPr lang="es-PE" i="1">
+                        <a:latin typeface="Cambria Math" panose="02040503050406030204" pitchFamily="18" charset="0"/>
+                      </a:rPr>
                       <m:t>= </m:t>
                     </m:r>
                     <m:sSub>
                       <m:sSubPr>
                         <m:ctrlPr>
-                          <a:rPr lang="en-US" i="1"/>
+                          <a:rPr lang="en-US" i="1">
+                            <a:latin typeface="Cambria Math" panose="02040503050406030204" pitchFamily="18" charset="0"/>
+                          </a:rPr>
                         </m:ctrlPr>
                       </m:sSubPr>
                       <m:e>
                         <m:r>
-                          <a:rPr lang="es-PE" i="1"/>
+                          <a:rPr lang="es-PE" i="1">
+                            <a:latin typeface="Cambria Math" panose="02040503050406030204" pitchFamily="18" charset="0"/>
+                          </a:rPr>
                           <m:t>𝛼</m:t>
                         </m:r>
                       </m:e>
                       <m:sub>
                         <m:r>
-                          <a:rPr lang="es-PE" i="1"/>
+                          <a:rPr lang="es-PE" i="1">
+                            <a:latin typeface="Cambria Math" panose="02040503050406030204" pitchFamily="18" charset="0"/>
+                          </a:rPr>
                           <m:t>1</m:t>
                         </m:r>
                       </m:sub>
                     </m:sSub>
                     <m:r>
-                      <a:rPr lang="es-PE" i="1"/>
+                      <a:rPr lang="es-PE" i="1">
+                        <a:latin typeface="Cambria Math" panose="02040503050406030204" pitchFamily="18" charset="0"/>
+                      </a:rPr>
                       <m:t>−</m:t>
                     </m:r>
                     <m:sSub>
                       <m:sSubPr>
                         <m:ctrlPr>
-                          <a:rPr lang="en-US" i="1"/>
+                          <a:rPr lang="en-US" i="1">
+                            <a:latin typeface="Cambria Math" panose="02040503050406030204" pitchFamily="18" charset="0"/>
+                          </a:rPr>
                         </m:ctrlPr>
                       </m:sSubPr>
                       <m:e>
                         <m:r>
-                          <a:rPr lang="es-PE" i="1"/>
+                          <a:rPr lang="es-PE" i="1">
+                            <a:latin typeface="Cambria Math" panose="02040503050406030204" pitchFamily="18" charset="0"/>
+                          </a:rPr>
                           <m:t>𝛼</m:t>
                         </m:r>
                       </m:e>
                       <m:sub>
                         <m:r>
-                          <a:rPr lang="es-PE" i="1"/>
+                          <a:rPr lang="es-PE" i="1">
+                            <a:latin typeface="Cambria Math" panose="02040503050406030204" pitchFamily="18" charset="0"/>
+                          </a:rPr>
                           <m:t>2</m:t>
                         </m:r>
                       </m:sub>
@@ -27034,41 +27044,55 @@
                     <m:sSub>
                       <m:sSubPr>
                         <m:ctrlPr>
-                          <a:rPr lang="en-US" i="1"/>
+                          <a:rPr lang="en-US" i="1">
+                            <a:latin typeface="Cambria Math" panose="02040503050406030204" pitchFamily="18" charset="0"/>
+                          </a:rPr>
                         </m:ctrlPr>
                       </m:sSubPr>
                       <m:e>
                         <m:r>
-                          <a:rPr lang="es-PE" i="1"/>
+                          <a:rPr lang="es-PE" i="1">
+                            <a:latin typeface="Cambria Math" panose="02040503050406030204" pitchFamily="18" charset="0"/>
+                          </a:rPr>
                           <m:t>𝑃</m:t>
                         </m:r>
                       </m:e>
                       <m:sub>
                         <m:r>
-                          <a:rPr lang="es-PE" i="1"/>
+                          <a:rPr lang="es-PE" i="1">
+                            <a:latin typeface="Cambria Math" panose="02040503050406030204" pitchFamily="18" charset="0"/>
+                          </a:rPr>
                           <m:t>𝑎</m:t>
                         </m:r>
                       </m:sub>
                     </m:sSub>
                     <m:r>
-                      <a:rPr lang="es-PE" i="1"/>
+                      <a:rPr lang="es-PE" i="1">
+                        <a:latin typeface="Cambria Math" panose="02040503050406030204" pitchFamily="18" charset="0"/>
+                      </a:rPr>
                       <m:t>+</m:t>
                     </m:r>
                     <m:sSub>
                       <m:sSubPr>
                         <m:ctrlPr>
-                          <a:rPr lang="en-US" i="1"/>
+                          <a:rPr lang="en-US" i="1">
+                            <a:latin typeface="Cambria Math" panose="02040503050406030204" pitchFamily="18" charset="0"/>
+                          </a:rPr>
                         </m:ctrlPr>
                       </m:sSubPr>
                       <m:e>
                         <m:r>
-                          <a:rPr lang="es-PE" i="1"/>
+                          <a:rPr lang="es-PE" i="1">
+                            <a:latin typeface="Cambria Math" panose="02040503050406030204" pitchFamily="18" charset="0"/>
+                          </a:rPr>
                           <m:t>𝛼</m:t>
                         </m:r>
                       </m:e>
                       <m:sub>
                         <m:r>
-                          <a:rPr lang="es-PE" i="1"/>
+                          <a:rPr lang="es-PE" i="1">
+                            <a:latin typeface="Cambria Math" panose="02040503050406030204" pitchFamily="18" charset="0"/>
+                          </a:rPr>
                           <m:t>3</m:t>
                         </m:r>
                       </m:sub>
@@ -27076,45 +27100,61 @@
                     <m:sSub>
                       <m:sSubPr>
                         <m:ctrlPr>
-                          <a:rPr lang="en-US" i="1"/>
+                          <a:rPr lang="en-US" i="1">
+                            <a:latin typeface="Cambria Math" panose="02040503050406030204" pitchFamily="18" charset="0"/>
+                          </a:rPr>
                         </m:ctrlPr>
                       </m:sSubPr>
                       <m:e>
                         <m:r>
-                          <a:rPr lang="es-PE" i="1"/>
+                          <a:rPr lang="es-PE" i="1">
+                            <a:latin typeface="Cambria Math" panose="02040503050406030204" pitchFamily="18" charset="0"/>
+                          </a:rPr>
                           <m:t>𝑃</m:t>
                         </m:r>
                       </m:e>
                       <m:sub>
                         <m:r>
-                          <a:rPr lang="es-PE" i="1"/>
+                          <a:rPr lang="es-PE" i="1">
+                            <a:latin typeface="Cambria Math" panose="02040503050406030204" pitchFamily="18" charset="0"/>
+                          </a:rPr>
                           <m:t>𝑏</m:t>
                         </m:r>
                       </m:sub>
                     </m:sSub>
                     <m:r>
-                      <a:rPr lang="es-PE" i="1"/>
+                      <a:rPr lang="es-PE" i="1">
+                        <a:latin typeface="Cambria Math" panose="02040503050406030204" pitchFamily="18" charset="0"/>
+                      </a:rPr>
                       <m:t>+</m:t>
                     </m:r>
                     <m:r>
-                      <a:rPr lang="es-PE" i="1"/>
+                      <a:rPr lang="es-PE" i="1">
+                        <a:latin typeface="Cambria Math" panose="02040503050406030204" pitchFamily="18" charset="0"/>
+                      </a:rPr>
                       <m:t>𝜃</m:t>
                     </m:r>
                     <m:sSub>
                       <m:sSubPr>
                         <m:ctrlPr>
-                          <a:rPr lang="en-US" i="1"/>
+                          <a:rPr lang="en-US" i="1">
+                            <a:latin typeface="Cambria Math" panose="02040503050406030204" pitchFamily="18" charset="0"/>
+                          </a:rPr>
                         </m:ctrlPr>
                       </m:sSubPr>
                       <m:e>
                         <m:r>
-                          <a:rPr lang="es-PE" i="1"/>
+                          <a:rPr lang="es-PE" i="1">
+                            <a:latin typeface="Cambria Math" panose="02040503050406030204" pitchFamily="18" charset="0"/>
+                          </a:rPr>
                           <m:t>𝑍</m:t>
                         </m:r>
                       </m:e>
                       <m:sub>
                         <m:r>
-                          <a:rPr lang="es-PE" i="1"/>
+                          <a:rPr lang="es-PE" i="1">
+                            <a:latin typeface="Cambria Math" panose="02040503050406030204" pitchFamily="18" charset="0"/>
+                          </a:rPr>
                           <m:t>𝑎</m:t>
                         </m:r>
                       </m:sub>
@@ -27143,64 +27183,86 @@
                     <m:sSub>
                       <m:sSubPr>
                         <m:ctrlPr>
-                          <a:rPr lang="en-US" i="1"/>
+                          <a:rPr lang="en-US" i="1">
+                            <a:latin typeface="Cambria Math" panose="02040503050406030204" pitchFamily="18" charset="0"/>
+                          </a:rPr>
                         </m:ctrlPr>
                       </m:sSubPr>
                       <m:e>
                         <m:r>
-                          <a:rPr lang="es-PE" i="1"/>
+                          <a:rPr lang="es-PE" i="1">
+                            <a:latin typeface="Cambria Math" panose="02040503050406030204" pitchFamily="18" charset="0"/>
+                          </a:rPr>
                           <m:t>𝐶</m:t>
                         </m:r>
                       </m:e>
                       <m:sub>
                         <m:r>
-                          <a:rPr lang="es-PE" i="1"/>
+                          <a:rPr lang="es-PE" i="1">
+                            <a:latin typeface="Cambria Math" panose="02040503050406030204" pitchFamily="18" charset="0"/>
+                          </a:rPr>
                           <m:t>𝑎</m:t>
                         </m:r>
                       </m:sub>
                     </m:sSub>
                     <m:r>
-                      <a:rPr lang="es-PE" i="1"/>
+                      <a:rPr lang="es-PE" i="1">
+                        <a:latin typeface="Cambria Math" panose="02040503050406030204" pitchFamily="18" charset="0"/>
+                      </a:rPr>
                       <m:t>= </m:t>
                     </m:r>
                     <m:sSub>
                       <m:sSubPr>
                         <m:ctrlPr>
-                          <a:rPr lang="en-US" i="1"/>
+                          <a:rPr lang="en-US" i="1">
+                            <a:latin typeface="Cambria Math" panose="02040503050406030204" pitchFamily="18" charset="0"/>
+                          </a:rPr>
                         </m:ctrlPr>
                       </m:sSubPr>
                       <m:e>
                         <m:r>
-                          <a:rPr lang="es-PE" i="1"/>
+                          <a:rPr lang="es-PE" i="1">
+                            <a:latin typeface="Cambria Math" panose="02040503050406030204" pitchFamily="18" charset="0"/>
+                          </a:rPr>
                           <m:t>𝜙</m:t>
                         </m:r>
                       </m:e>
                       <m:sub>
                         <m:r>
-                          <a:rPr lang="es-PE" i="1"/>
+                          <a:rPr lang="es-PE" i="1">
+                            <a:latin typeface="Cambria Math" panose="02040503050406030204" pitchFamily="18" charset="0"/>
+                          </a:rPr>
                           <m:t>𝑎</m:t>
                         </m:r>
                       </m:sub>
                     </m:sSub>
                     <m:r>
-                      <a:rPr lang="es-PE" i="1"/>
+                      <a:rPr lang="es-PE" i="1">
+                        <a:latin typeface="Cambria Math" panose="02040503050406030204" pitchFamily="18" charset="0"/>
+                      </a:rPr>
                       <m:t>+</m:t>
                     </m:r>
                     <m:sSub>
                       <m:sSubPr>
                         <m:ctrlPr>
-                          <a:rPr lang="en-US" i="1"/>
+                          <a:rPr lang="en-US" i="1">
+                            <a:latin typeface="Cambria Math" panose="02040503050406030204" pitchFamily="18" charset="0"/>
+                          </a:rPr>
                         </m:ctrlPr>
                       </m:sSubPr>
                       <m:e>
                         <m:r>
-                          <a:rPr lang="es-PE" i="1"/>
+                          <a:rPr lang="es-PE" i="1">
+                            <a:latin typeface="Cambria Math" panose="02040503050406030204" pitchFamily="18" charset="0"/>
+                          </a:rPr>
                           <m:t>𝛿</m:t>
                         </m:r>
                       </m:e>
                       <m:sub>
                         <m:r>
-                          <a:rPr lang="es-PE" i="1"/>
+                          <a:rPr lang="es-PE" i="1">
+                            <a:latin typeface="Cambria Math" panose="02040503050406030204" pitchFamily="18" charset="0"/>
+                          </a:rPr>
                           <m:t>𝑎</m:t>
                         </m:r>
                       </m:sub>
@@ -27208,18 +27270,24 @@
                     <m:sSub>
                       <m:sSubPr>
                         <m:ctrlPr>
-                          <a:rPr lang="en-US" i="1"/>
+                          <a:rPr lang="en-US" i="1">
+                            <a:latin typeface="Cambria Math" panose="02040503050406030204" pitchFamily="18" charset="0"/>
+                          </a:rPr>
                         </m:ctrlPr>
                       </m:sSubPr>
                       <m:e>
                         <m:r>
-                          <a:rPr lang="es-PE" i="1"/>
+                          <a:rPr lang="es-PE" i="1">
+                            <a:latin typeface="Cambria Math" panose="02040503050406030204" pitchFamily="18" charset="0"/>
+                          </a:rPr>
                           <m:t>𝑄</m:t>
                         </m:r>
                       </m:e>
                       <m:sub>
                         <m:r>
-                          <a:rPr lang="es-PE" i="1"/>
+                          <a:rPr lang="es-PE" i="1">
+                            <a:latin typeface="Cambria Math" panose="02040503050406030204" pitchFamily="18" charset="0"/>
+                          </a:rPr>
                           <m:t>𝑎</m:t>
                         </m:r>
                       </m:sub>
@@ -27256,18 +27324,24 @@
                       <m:sSub>
                         <m:sSubPr>
                           <m:ctrlPr>
-                            <a:rPr lang="en-US" i="1"/>
+                            <a:rPr lang="en-US" i="1">
+                              <a:latin typeface="Cambria Math" panose="02040503050406030204" pitchFamily="18" charset="0"/>
+                            </a:rPr>
                           </m:ctrlPr>
                         </m:sSubPr>
                         <m:e>
                           <m:r>
-                            <a:rPr lang="es-PE" i="1"/>
+                            <a:rPr lang="es-PE" i="1">
+                              <a:latin typeface="Cambria Math" panose="02040503050406030204" pitchFamily="18" charset="0"/>
+                            </a:rPr>
                             <m:t>𝑃</m:t>
                           </m:r>
                         </m:e>
                         <m:sub>
                           <m:r>
-                            <a:rPr lang="es-PE" i="1"/>
+                            <a:rPr lang="es-PE" i="1">
+                              <a:latin typeface="Cambria Math" panose="02040503050406030204" pitchFamily="18" charset="0"/>
+                            </a:rPr>
                             <m:t>𝑎</m:t>
                           </m:r>
                         </m:sub>
@@ -27276,35 +27350,47 @@
                         <m:rPr>
                           <m:aln/>
                         </m:rPr>
-                        <a:rPr lang="es-PE" i="1"/>
+                        <a:rPr lang="es-PE" i="1">
+                          <a:latin typeface="Cambria Math" panose="02040503050406030204" pitchFamily="18" charset="0"/>
+                        </a:rPr>
                         <m:t>=</m:t>
                       </m:r>
                       <m:r>
-                        <a:rPr lang="es-PE" i="1"/>
+                        <a:rPr lang="es-PE" i="1">
+                          <a:latin typeface="Cambria Math" panose="02040503050406030204" pitchFamily="18" charset="0"/>
+                        </a:rPr>
                         <m:t>𝑅</m:t>
                       </m:r>
                       <m:d>
                         <m:dPr>
                           <m:ctrlPr>
-                            <a:rPr lang="en-US" i="1"/>
+                            <a:rPr lang="en-US" i="1">
+                              <a:latin typeface="Cambria Math" panose="02040503050406030204" pitchFamily="18" charset="0"/>
+                            </a:rPr>
                           </m:ctrlPr>
                         </m:dPr>
                         <m:e>
                           <m:sSub>
                             <m:sSubPr>
                               <m:ctrlPr>
-                                <a:rPr lang="en-US" i="1"/>
+                                <a:rPr lang="en-US" i="1">
+                                  <a:latin typeface="Cambria Math" panose="02040503050406030204" pitchFamily="18" charset="0"/>
+                                </a:rPr>
                               </m:ctrlPr>
                             </m:sSubPr>
                             <m:e>
                               <m:r>
-                                <a:rPr lang="es-PE" i="1"/>
+                                <a:rPr lang="es-PE" i="1">
+                                  <a:latin typeface="Cambria Math" panose="02040503050406030204" pitchFamily="18" charset="0"/>
+                                </a:rPr>
                                 <m:t>𝑃</m:t>
                               </m:r>
                             </m:e>
                             <m:sub>
                               <m:r>
-                                <a:rPr lang="es-PE" i="1"/>
+                                <a:rPr lang="es-PE" i="1">
+                                  <a:latin typeface="Cambria Math" panose="02040503050406030204" pitchFamily="18" charset="0"/>
+                                </a:rPr>
                                 <m:t>𝑏</m:t>
                               </m:r>
                             </m:sub>
@@ -27312,31 +27398,41 @@
                         </m:e>
                       </m:d>
                       <m:r>
-                        <a:rPr lang="es-PE" i="1"/>
+                        <a:rPr lang="es-PE" i="1">
+                          <a:latin typeface="Cambria Math" panose="02040503050406030204" pitchFamily="18" charset="0"/>
+                        </a:rPr>
                         <m:t>=</m:t>
                       </m:r>
                       <m:f>
                         <m:fPr>
                           <m:ctrlPr>
-                            <a:rPr lang="en-US" i="1"/>
+                            <a:rPr lang="en-US" i="1">
+                              <a:latin typeface="Cambria Math" panose="02040503050406030204" pitchFamily="18" charset="0"/>
+                            </a:rPr>
                           </m:ctrlPr>
                         </m:fPr>
                         <m:num>
                           <m:sSub>
                             <m:sSubPr>
                               <m:ctrlPr>
-                                <a:rPr lang="en-US" i="1"/>
+                                <a:rPr lang="en-US" i="1">
+                                  <a:latin typeface="Cambria Math" panose="02040503050406030204" pitchFamily="18" charset="0"/>
+                                </a:rPr>
                               </m:ctrlPr>
                             </m:sSubPr>
                             <m:e>
                               <m:r>
-                                <a:rPr lang="es-PE" i="1"/>
+                                <a:rPr lang="es-PE" i="1">
+                                  <a:latin typeface="Cambria Math" panose="02040503050406030204" pitchFamily="18" charset="0"/>
+                                </a:rPr>
                                 <m:t>𝛼</m:t>
                               </m:r>
                             </m:e>
                             <m:sub>
                               <m:r>
-                                <a:rPr lang="es-PE" i="1"/>
+                                <a:rPr lang="es-PE" i="1">
+                                  <a:latin typeface="Cambria Math" panose="02040503050406030204" pitchFamily="18" charset="0"/>
+                                </a:rPr>
                                 <m:t>1</m:t>
                               </m:r>
                             </m:sub>
@@ -27344,24 +27440,32 @@
                         </m:num>
                         <m:den>
                           <m:r>
-                            <a:rPr lang="es-PE" i="1"/>
+                            <a:rPr lang="es-PE" i="1">
+                              <a:latin typeface="Cambria Math" panose="02040503050406030204" pitchFamily="18" charset="0"/>
+                            </a:rPr>
                             <m:t>2</m:t>
                           </m:r>
                           <m:sSub>
                             <m:sSubPr>
                               <m:ctrlPr>
-                                <a:rPr lang="en-US" i="1"/>
+                                <a:rPr lang="en-US" i="1">
+                                  <a:latin typeface="Cambria Math" panose="02040503050406030204" pitchFamily="18" charset="0"/>
+                                </a:rPr>
                               </m:ctrlPr>
                             </m:sSubPr>
                             <m:e>
                               <m:r>
-                                <a:rPr lang="es-PE" i="1"/>
+                                <a:rPr lang="es-PE" i="1">
+                                  <a:latin typeface="Cambria Math" panose="02040503050406030204" pitchFamily="18" charset="0"/>
+                                </a:rPr>
                                 <m:t>𝛼</m:t>
                               </m:r>
                             </m:e>
                             <m:sub>
                               <m:r>
-                                <a:rPr lang="es-PE" i="1"/>
+                                <a:rPr lang="es-PE" i="1">
+                                  <a:latin typeface="Cambria Math" panose="02040503050406030204" pitchFamily="18" charset="0"/>
+                                </a:rPr>
                                 <m:t>2</m:t>
                               </m:r>
                             </m:sub>
@@ -27369,24 +27473,32 @@
                         </m:den>
                       </m:f>
                       <m:r>
-                        <a:rPr lang="es-PE" i="1"/>
+                        <a:rPr lang="es-PE" i="1">
+                          <a:latin typeface="Cambria Math" panose="02040503050406030204" pitchFamily="18" charset="0"/>
+                        </a:rPr>
                         <m:t>+</m:t>
                       </m:r>
                       <m:f>
                         <m:fPr>
                           <m:ctrlPr>
-                            <a:rPr lang="en-US" i="1"/>
+                            <a:rPr lang="en-US" i="1">
+                              <a:latin typeface="Cambria Math" panose="02040503050406030204" pitchFamily="18" charset="0"/>
+                            </a:rPr>
                           </m:ctrlPr>
                         </m:fPr>
                         <m:num>
                           <m:r>
-                            <a:rPr lang="es-PE" i="1"/>
+                            <a:rPr lang="es-PE" i="1">
+                              <a:latin typeface="Cambria Math" panose="02040503050406030204" pitchFamily="18" charset="0"/>
+                            </a:rPr>
                             <m:t>1</m:t>
                           </m:r>
                         </m:num>
                         <m:den>
                           <m:r>
-                            <a:rPr lang="es-PE" i="1"/>
+                            <a:rPr lang="es-PE" i="1">
+                              <a:latin typeface="Cambria Math" panose="02040503050406030204" pitchFamily="18" charset="0"/>
+                            </a:rPr>
                             <m:t>2</m:t>
                           </m:r>
                         </m:den>
@@ -27394,58 +27506,78 @@
                       <m:sSub>
                         <m:sSubPr>
                           <m:ctrlPr>
-                            <a:rPr lang="en-US" i="1"/>
+                            <a:rPr lang="en-US" i="1">
+                              <a:latin typeface="Cambria Math" panose="02040503050406030204" pitchFamily="18" charset="0"/>
+                            </a:rPr>
                           </m:ctrlPr>
                         </m:sSubPr>
                         <m:e>
                           <m:r>
-                            <a:rPr lang="es-PE" i="1"/>
+                            <a:rPr lang="es-PE" i="1">
+                              <a:latin typeface="Cambria Math" panose="02040503050406030204" pitchFamily="18" charset="0"/>
+                            </a:rPr>
                             <m:t>𝛿</m:t>
                           </m:r>
                         </m:e>
                         <m:sub>
                           <m:r>
-                            <a:rPr lang="es-PE" i="1"/>
+                            <a:rPr lang="es-PE" i="1">
+                              <a:latin typeface="Cambria Math" panose="02040503050406030204" pitchFamily="18" charset="0"/>
+                            </a:rPr>
                             <m:t>𝑎</m:t>
                           </m:r>
                         </m:sub>
                       </m:sSub>
                       <m:r>
-                        <a:rPr lang="es-PE" i="1"/>
+                        <a:rPr lang="es-PE" i="1">
+                          <a:latin typeface="Cambria Math" panose="02040503050406030204" pitchFamily="18" charset="0"/>
+                        </a:rPr>
                         <m:t>+</m:t>
                       </m:r>
                       <m:f>
                         <m:fPr>
                           <m:ctrlPr>
-                            <a:rPr lang="en-US" i="1"/>
+                            <a:rPr lang="en-US" i="1">
+                              <a:latin typeface="Cambria Math" panose="02040503050406030204" pitchFamily="18" charset="0"/>
+                            </a:rPr>
                           </m:ctrlPr>
                         </m:fPr>
                         <m:num>
                           <m:r>
-                            <a:rPr lang="es-PE" i="1"/>
+                            <a:rPr lang="es-PE" i="1">
+                              <a:latin typeface="Cambria Math" panose="02040503050406030204" pitchFamily="18" charset="0"/>
+                            </a:rPr>
                             <m:t>𝜃</m:t>
                           </m:r>
                         </m:num>
                         <m:den>
                           <m:r>
-                            <a:rPr lang="es-PE" i="1"/>
+                            <a:rPr lang="es-PE" i="1">
+                              <a:latin typeface="Cambria Math" panose="02040503050406030204" pitchFamily="18" charset="0"/>
+                            </a:rPr>
                             <m:t>2</m:t>
                           </m:r>
                           <m:sSub>
                             <m:sSubPr>
                               <m:ctrlPr>
-                                <a:rPr lang="en-US" i="1"/>
+                                <a:rPr lang="en-US" i="1">
+                                  <a:latin typeface="Cambria Math" panose="02040503050406030204" pitchFamily="18" charset="0"/>
+                                </a:rPr>
                               </m:ctrlPr>
                             </m:sSubPr>
                             <m:e>
                               <m:r>
-                                <a:rPr lang="es-PE" i="1"/>
+                                <a:rPr lang="es-PE" i="1">
+                                  <a:latin typeface="Cambria Math" panose="02040503050406030204" pitchFamily="18" charset="0"/>
+                                </a:rPr>
                                 <m:t>𝛼</m:t>
                               </m:r>
                             </m:e>
                             <m:sub>
                               <m:r>
-                                <a:rPr lang="es-PE" i="1"/>
+                                <a:rPr lang="es-PE" i="1">
+                                  <a:latin typeface="Cambria Math" panose="02040503050406030204" pitchFamily="18" charset="0"/>
+                                </a:rPr>
                                 <m:t>2</m:t>
                               </m:r>
                             </m:sub>
@@ -27455,48 +27587,64 @@
                       <m:sSub>
                         <m:sSubPr>
                           <m:ctrlPr>
-                            <a:rPr lang="en-US" i="1"/>
+                            <a:rPr lang="en-US" i="1">
+                              <a:latin typeface="Cambria Math" panose="02040503050406030204" pitchFamily="18" charset="0"/>
+                            </a:rPr>
                           </m:ctrlPr>
                         </m:sSubPr>
                         <m:e>
                           <m:r>
-                            <a:rPr lang="es-PE" i="1"/>
+                            <a:rPr lang="es-PE" i="1">
+                              <a:latin typeface="Cambria Math" panose="02040503050406030204" pitchFamily="18" charset="0"/>
+                            </a:rPr>
                             <m:t>𝑍</m:t>
                           </m:r>
                         </m:e>
                         <m:sub>
                           <m:r>
-                            <a:rPr lang="es-PE" i="1"/>
+                            <a:rPr lang="es-PE" i="1">
+                              <a:latin typeface="Cambria Math" panose="02040503050406030204" pitchFamily="18" charset="0"/>
+                            </a:rPr>
                             <m:t>𝑎</m:t>
                           </m:r>
                         </m:sub>
                       </m:sSub>
                       <m:r>
-                        <a:rPr lang="es-PE" i="1"/>
+                        <a:rPr lang="es-PE" i="1">
+                          <a:latin typeface="Cambria Math" panose="02040503050406030204" pitchFamily="18" charset="0"/>
+                        </a:rPr>
                         <m:t>+</m:t>
                       </m:r>
                       <m:f>
                         <m:fPr>
                           <m:ctrlPr>
-                            <a:rPr lang="en-US" i="1"/>
+                            <a:rPr lang="en-US" i="1">
+                              <a:latin typeface="Cambria Math" panose="02040503050406030204" pitchFamily="18" charset="0"/>
+                            </a:rPr>
                           </m:ctrlPr>
                         </m:fPr>
                         <m:num>
                           <m:sSub>
                             <m:sSubPr>
                               <m:ctrlPr>
-                                <a:rPr lang="en-US" i="1"/>
+                                <a:rPr lang="en-US" i="1">
+                                  <a:latin typeface="Cambria Math" panose="02040503050406030204" pitchFamily="18" charset="0"/>
+                                </a:rPr>
                               </m:ctrlPr>
                             </m:sSubPr>
                             <m:e>
                               <m:r>
-                                <a:rPr lang="es-PE" i="1"/>
+                                <a:rPr lang="es-PE" i="1">
+                                  <a:latin typeface="Cambria Math" panose="02040503050406030204" pitchFamily="18" charset="0"/>
+                                </a:rPr>
                                 <m:t>𝛼</m:t>
                               </m:r>
                             </m:e>
                             <m:sub>
                               <m:r>
-                                <a:rPr lang="es-PE" i="1"/>
+                                <a:rPr lang="es-PE" i="1">
+                                  <a:latin typeface="Cambria Math" panose="02040503050406030204" pitchFamily="18" charset="0"/>
+                                </a:rPr>
                                 <m:t>3</m:t>
                               </m:r>
                             </m:sub>
@@ -27504,24 +27652,32 @@
                         </m:num>
                         <m:den>
                           <m:r>
-                            <a:rPr lang="es-PE" i="1"/>
+                            <a:rPr lang="es-PE" i="1">
+                              <a:latin typeface="Cambria Math" panose="02040503050406030204" pitchFamily="18" charset="0"/>
+                            </a:rPr>
                             <m:t>2</m:t>
                           </m:r>
                           <m:sSub>
                             <m:sSubPr>
                               <m:ctrlPr>
-                                <a:rPr lang="en-US" i="1"/>
+                                <a:rPr lang="en-US" i="1">
+                                  <a:latin typeface="Cambria Math" panose="02040503050406030204" pitchFamily="18" charset="0"/>
+                                </a:rPr>
                               </m:ctrlPr>
                             </m:sSubPr>
                             <m:e>
                               <m:r>
-                                <a:rPr lang="es-PE" i="1"/>
+                                <a:rPr lang="es-PE" i="1">
+                                  <a:latin typeface="Cambria Math" panose="02040503050406030204" pitchFamily="18" charset="0"/>
+                                </a:rPr>
                                 <m:t>𝛼</m:t>
                               </m:r>
                             </m:e>
                             <m:sub>
                               <m:r>
-                                <a:rPr lang="es-PE" i="1"/>
+                                <a:rPr lang="es-PE" i="1">
+                                  <a:latin typeface="Cambria Math" panose="02040503050406030204" pitchFamily="18" charset="0"/>
+                                </a:rPr>
                                 <m:t>2</m:t>
                               </m:r>
                             </m:sub>
@@ -27531,18 +27687,24 @@
                       <m:sSub>
                         <m:sSubPr>
                           <m:ctrlPr>
-                            <a:rPr lang="en-US" i="1"/>
+                            <a:rPr lang="en-US" i="1">
+                              <a:latin typeface="Cambria Math" panose="02040503050406030204" pitchFamily="18" charset="0"/>
+                            </a:rPr>
                           </m:ctrlPr>
                         </m:sSubPr>
                         <m:e>
                           <m:r>
-                            <a:rPr lang="es-PE" i="1"/>
+                            <a:rPr lang="es-PE" i="1">
+                              <a:latin typeface="Cambria Math" panose="02040503050406030204" pitchFamily="18" charset="0"/>
+                            </a:rPr>
                             <m:t>𝑃</m:t>
                           </m:r>
                         </m:e>
                         <m:sub>
                           <m:r>
-                            <a:rPr lang="es-PE" i="1"/>
+                            <a:rPr lang="es-PE" i="1">
+                              <a:latin typeface="Cambria Math" panose="02040503050406030204" pitchFamily="18" charset="0"/>
+                            </a:rPr>
                             <m:t>𝑏</m:t>
                           </m:r>
                         </m:sub>
@@ -27583,64 +27745,86 @@
                       <m:sSub>
                         <m:sSubPr>
                           <m:ctrlPr>
-                            <a:rPr lang="en-US" i="1"/>
+                            <a:rPr lang="en-US" i="1">
+                              <a:latin typeface="Cambria Math" panose="02040503050406030204" pitchFamily="18" charset="0"/>
+                            </a:rPr>
                           </m:ctrlPr>
                         </m:sSubPr>
                         <m:e>
                           <m:r>
-                            <a:rPr lang="es-PE" i="1"/>
+                            <a:rPr lang="es-PE" i="1">
+                              <a:latin typeface="Cambria Math" panose="02040503050406030204" pitchFamily="18" charset="0"/>
+                            </a:rPr>
                             <m:t>𝑅</m:t>
                           </m:r>
                         </m:e>
                         <m:sub>
                           <m:r>
-                            <a:rPr lang="es-PE" i="1"/>
+                            <a:rPr lang="es-PE" i="1">
+                              <a:latin typeface="Cambria Math" panose="02040503050406030204" pitchFamily="18" charset="0"/>
+                            </a:rPr>
                             <m:t>𝑎</m:t>
                           </m:r>
                         </m:sub>
                       </m:sSub>
                       <m:r>
-                        <a:rPr lang="es-PE" i="1"/>
+                        <a:rPr lang="es-PE" i="1">
+                          <a:latin typeface="Cambria Math" panose="02040503050406030204" pitchFamily="18" charset="0"/>
+                        </a:rPr>
                         <m:t>=</m:t>
                       </m:r>
                       <m:sSub>
                         <m:sSubPr>
                           <m:ctrlPr>
-                            <a:rPr lang="en-US" i="1"/>
+                            <a:rPr lang="en-US" i="1">
+                              <a:latin typeface="Cambria Math" panose="02040503050406030204" pitchFamily="18" charset="0"/>
+                            </a:rPr>
                           </m:ctrlPr>
                         </m:sSubPr>
                         <m:e>
                           <m:r>
-                            <a:rPr lang="es-PE" i="1"/>
+                            <a:rPr lang="es-PE" i="1">
+                              <a:latin typeface="Cambria Math" panose="02040503050406030204" pitchFamily="18" charset="0"/>
+                            </a:rPr>
                             <m:t>𝛽</m:t>
                           </m:r>
                         </m:e>
                         <m:sub>
                           <m:r>
-                            <a:rPr lang="es-PE" i="1"/>
+                            <a:rPr lang="es-PE" i="1">
+                              <a:latin typeface="Cambria Math" panose="02040503050406030204" pitchFamily="18" charset="0"/>
+                            </a:rPr>
                             <m:t>1</m:t>
                           </m:r>
                         </m:sub>
                       </m:sSub>
                       <m:r>
-                        <a:rPr lang="es-PE" i="1"/>
+                        <a:rPr lang="es-PE" i="1">
+                          <a:latin typeface="Cambria Math" panose="02040503050406030204" pitchFamily="18" charset="0"/>
+                        </a:rPr>
                         <m:t>+</m:t>
                       </m:r>
                       <m:f>
                         <m:fPr>
                           <m:ctrlPr>
-                            <a:rPr lang="en-US" i="1"/>
+                            <a:rPr lang="en-US" i="1">
+                              <a:latin typeface="Cambria Math" panose="02040503050406030204" pitchFamily="18" charset="0"/>
+                            </a:rPr>
                           </m:ctrlPr>
                         </m:fPr>
                         <m:num>
                           <m:r>
-                            <a:rPr lang="es-PE" i="1"/>
+                            <a:rPr lang="es-PE" i="1">
+                              <a:latin typeface="Cambria Math" panose="02040503050406030204" pitchFamily="18" charset="0"/>
+                            </a:rPr>
                             <m:t>1</m:t>
                           </m:r>
                         </m:num>
                         <m:den>
                           <m:r>
-                            <a:rPr lang="es-PE" i="1"/>
+                            <a:rPr lang="es-PE" i="1">
+                              <a:latin typeface="Cambria Math" panose="02040503050406030204" pitchFamily="18" charset="0"/>
+                            </a:rPr>
                             <m:t>2</m:t>
                           </m:r>
                         </m:den>
@@ -27648,41 +27832,55 @@
                       <m:sSub>
                         <m:sSubPr>
                           <m:ctrlPr>
-                            <a:rPr lang="en-US" i="1"/>
+                            <a:rPr lang="en-US" i="1">
+                              <a:latin typeface="Cambria Math" panose="02040503050406030204" pitchFamily="18" charset="0"/>
+                            </a:rPr>
                           </m:ctrlPr>
                         </m:sSubPr>
                         <m:e>
                           <m:r>
-                            <a:rPr lang="es-PE" i="1"/>
+                            <a:rPr lang="es-PE" i="1">
+                              <a:latin typeface="Cambria Math" panose="02040503050406030204" pitchFamily="18" charset="0"/>
+                            </a:rPr>
                             <m:t>𝛿</m:t>
                           </m:r>
                         </m:e>
                         <m:sub>
                           <m:r>
-                            <a:rPr lang="es-PE" i="1"/>
+                            <a:rPr lang="es-PE" i="1">
+                              <a:latin typeface="Cambria Math" panose="02040503050406030204" pitchFamily="18" charset="0"/>
+                            </a:rPr>
                             <m:t>𝑎</m:t>
                           </m:r>
                         </m:sub>
                       </m:sSub>
                       <m:r>
-                        <a:rPr lang="es-PE" i="1"/>
+                        <a:rPr lang="es-PE" i="1">
+                          <a:latin typeface="Cambria Math" panose="02040503050406030204" pitchFamily="18" charset="0"/>
+                        </a:rPr>
                         <m:t>+</m:t>
                       </m:r>
                       <m:sSub>
                         <m:sSubPr>
                           <m:ctrlPr>
-                            <a:rPr lang="en-US" i="1"/>
+                            <a:rPr lang="en-US" i="1">
+                              <a:latin typeface="Cambria Math" panose="02040503050406030204" pitchFamily="18" charset="0"/>
+                            </a:rPr>
                           </m:ctrlPr>
                         </m:sSubPr>
                         <m:e>
                           <m:r>
-                            <a:rPr lang="es-PE" i="1"/>
+                            <a:rPr lang="es-PE" i="1">
+                              <a:latin typeface="Cambria Math" panose="02040503050406030204" pitchFamily="18" charset="0"/>
+                            </a:rPr>
                             <m:t>𝛽</m:t>
                           </m:r>
                         </m:e>
                         <m:sub>
                           <m:r>
-                            <a:rPr lang="es-PE" i="1"/>
+                            <a:rPr lang="es-PE" i="1">
+                              <a:latin typeface="Cambria Math" panose="02040503050406030204" pitchFamily="18" charset="0"/>
+                            </a:rPr>
                             <m:t>2</m:t>
                           </m:r>
                         </m:sub>
@@ -27690,49 +27888,67 @@
                       <m:sSub>
                         <m:sSubPr>
                           <m:ctrlPr>
-                            <a:rPr lang="en-US" i="1"/>
+                            <a:rPr lang="en-US" i="1">
+                              <a:latin typeface="Cambria Math" panose="02040503050406030204" pitchFamily="18" charset="0"/>
+                            </a:rPr>
                           </m:ctrlPr>
                         </m:sSubPr>
                         <m:e>
                           <m:r>
-                            <a:rPr lang="es-PE" i="1"/>
+                            <a:rPr lang="es-PE" i="1">
+                              <a:latin typeface="Cambria Math" panose="02040503050406030204" pitchFamily="18" charset="0"/>
+                            </a:rPr>
                             <m:t>𝑍</m:t>
                           </m:r>
                         </m:e>
                         <m:sub>
                           <m:r>
-                            <a:rPr lang="es-PE" i="1"/>
+                            <a:rPr lang="es-PE" i="1">
+                              <a:latin typeface="Cambria Math" panose="02040503050406030204" pitchFamily="18" charset="0"/>
+                            </a:rPr>
                             <m:t>𝑎</m:t>
                           </m:r>
                         </m:sub>
                       </m:sSub>
                       <m:r>
-                        <a:rPr lang="es-PE" i="1"/>
+                        <a:rPr lang="es-PE" i="1">
+                          <a:latin typeface="Cambria Math" panose="02040503050406030204" pitchFamily="18" charset="0"/>
+                        </a:rPr>
                         <m:t>+</m:t>
                       </m:r>
                       <m:r>
-                        <a:rPr lang="es-PE" i="1"/>
+                        <a:rPr lang="es-PE" i="1">
+                          <a:latin typeface="Cambria Math" panose="02040503050406030204" pitchFamily="18" charset="0"/>
+                        </a:rPr>
                         <m:t>𝜌</m:t>
                       </m:r>
                       <m:sSub>
                         <m:sSubPr>
                           <m:ctrlPr>
-                            <a:rPr lang="en-US" i="1"/>
+                            <a:rPr lang="en-US" i="1">
+                              <a:latin typeface="Cambria Math" panose="02040503050406030204" pitchFamily="18" charset="0"/>
+                            </a:rPr>
                           </m:ctrlPr>
                         </m:sSubPr>
                         <m:e>
                           <m:r>
-                            <a:rPr lang="es-PE" i="1"/>
+                            <a:rPr lang="es-PE" i="1">
+                              <a:latin typeface="Cambria Math" panose="02040503050406030204" pitchFamily="18" charset="0"/>
+                            </a:rPr>
                             <m:t>𝑃</m:t>
                           </m:r>
                         </m:e>
                         <m:sub>
                           <m:r>
-                            <a:rPr lang="es-PE" i="1"/>
+                            <a:rPr lang="es-PE" i="1">
+                              <a:latin typeface="Cambria Math" panose="02040503050406030204" pitchFamily="18" charset="0"/>
+                            </a:rPr>
                             <m:t>𝑏</m:t>
                           </m:r>
                           <m:r>
-                            <a:rPr lang="es-PE" i="1"/>
+                            <a:rPr lang="es-PE" i="1">
+                              <a:latin typeface="Cambria Math" panose="02040503050406030204" pitchFamily="18" charset="0"/>
+                            </a:rPr>
                             <m:t> </m:t>
                           </m:r>
                         </m:sub>
@@ -27757,64 +27973,86 @@
                       <m:sSub>
                         <m:sSubPr>
                           <m:ctrlPr>
-                            <a:rPr lang="en-US" i="1"/>
+                            <a:rPr lang="en-US" i="1">
+                              <a:latin typeface="Cambria Math" panose="02040503050406030204" pitchFamily="18" charset="0"/>
+                            </a:rPr>
                           </m:ctrlPr>
                         </m:sSubPr>
                         <m:e>
                           <m:r>
-                            <a:rPr lang="es-PE" i="1"/>
+                            <a:rPr lang="es-PE" i="1">
+                              <a:latin typeface="Cambria Math" panose="02040503050406030204" pitchFamily="18" charset="0"/>
+                            </a:rPr>
                             <m:t>𝑅</m:t>
                           </m:r>
                         </m:e>
                         <m:sub>
                           <m:r>
-                            <a:rPr lang="es-PE" i="1"/>
+                            <a:rPr lang="es-PE" i="1">
+                              <a:latin typeface="Cambria Math" panose="02040503050406030204" pitchFamily="18" charset="0"/>
+                            </a:rPr>
                             <m:t>𝑏</m:t>
                           </m:r>
                         </m:sub>
                       </m:sSub>
                       <m:r>
-                        <a:rPr lang="es-PE" i="1"/>
+                        <a:rPr lang="es-PE" i="1">
+                          <a:latin typeface="Cambria Math" panose="02040503050406030204" pitchFamily="18" charset="0"/>
+                        </a:rPr>
                         <m:t>= </m:t>
                       </m:r>
                       <m:sSub>
                         <m:sSubPr>
                           <m:ctrlPr>
-                            <a:rPr lang="en-US" i="1"/>
+                            <a:rPr lang="en-US" i="1">
+                              <a:latin typeface="Cambria Math" panose="02040503050406030204" pitchFamily="18" charset="0"/>
+                            </a:rPr>
                           </m:ctrlPr>
                         </m:sSubPr>
                         <m:e>
                           <m:r>
-                            <a:rPr lang="es-PE" i="1"/>
+                            <a:rPr lang="es-PE" i="1">
+                              <a:latin typeface="Cambria Math" panose="02040503050406030204" pitchFamily="18" charset="0"/>
+                            </a:rPr>
                             <m:t>𝛽</m:t>
                           </m:r>
                         </m:e>
                         <m:sub>
                           <m:r>
-                            <a:rPr lang="es-PE" i="1"/>
+                            <a:rPr lang="es-PE" i="1">
+                              <a:latin typeface="Cambria Math" panose="02040503050406030204" pitchFamily="18" charset="0"/>
+                            </a:rPr>
                             <m:t>1</m:t>
                           </m:r>
                         </m:sub>
                       </m:sSub>
                       <m:r>
-                        <a:rPr lang="es-PE" i="1"/>
+                        <a:rPr lang="es-PE" i="1">
+                          <a:latin typeface="Cambria Math" panose="02040503050406030204" pitchFamily="18" charset="0"/>
+                        </a:rPr>
                         <m:t>+</m:t>
                       </m:r>
                       <m:f>
                         <m:fPr>
                           <m:ctrlPr>
-                            <a:rPr lang="en-US" i="1"/>
+                            <a:rPr lang="en-US" i="1">
+                              <a:latin typeface="Cambria Math" panose="02040503050406030204" pitchFamily="18" charset="0"/>
+                            </a:rPr>
                           </m:ctrlPr>
                         </m:fPr>
                         <m:num>
                           <m:r>
-                            <a:rPr lang="es-PE" i="1"/>
+                            <a:rPr lang="es-PE" i="1">
+                              <a:latin typeface="Cambria Math" panose="02040503050406030204" pitchFamily="18" charset="0"/>
+                            </a:rPr>
                             <m:t>1</m:t>
                           </m:r>
                         </m:num>
                         <m:den>
                           <m:r>
-                            <a:rPr lang="es-PE" i="1"/>
+                            <a:rPr lang="es-PE" i="1">
+                              <a:latin typeface="Cambria Math" panose="02040503050406030204" pitchFamily="18" charset="0"/>
+                            </a:rPr>
                             <m:t>2</m:t>
                           </m:r>
                         </m:den>
@@ -27822,41 +28060,55 @@
                       <m:sSub>
                         <m:sSubPr>
                           <m:ctrlPr>
-                            <a:rPr lang="en-US" i="1"/>
+                            <a:rPr lang="en-US" i="1">
+                              <a:latin typeface="Cambria Math" panose="02040503050406030204" pitchFamily="18" charset="0"/>
+                            </a:rPr>
                           </m:ctrlPr>
                         </m:sSubPr>
                         <m:e>
                           <m:r>
-                            <a:rPr lang="es-PE" i="1"/>
+                            <a:rPr lang="es-PE" i="1">
+                              <a:latin typeface="Cambria Math" panose="02040503050406030204" pitchFamily="18" charset="0"/>
+                            </a:rPr>
                             <m:t>𝛿</m:t>
                           </m:r>
                         </m:e>
                         <m:sub>
                           <m:r>
-                            <a:rPr lang="es-PE" i="1"/>
+                            <a:rPr lang="es-PE" i="1">
+                              <a:latin typeface="Cambria Math" panose="02040503050406030204" pitchFamily="18" charset="0"/>
+                            </a:rPr>
                             <m:t>𝑏</m:t>
                           </m:r>
                         </m:sub>
                       </m:sSub>
                       <m:r>
-                        <a:rPr lang="es-PE" i="1"/>
+                        <a:rPr lang="es-PE" i="1">
+                          <a:latin typeface="Cambria Math" panose="02040503050406030204" pitchFamily="18" charset="0"/>
+                        </a:rPr>
                         <m:t>+</m:t>
                       </m:r>
                       <m:sSub>
                         <m:sSubPr>
                           <m:ctrlPr>
-                            <a:rPr lang="en-US" i="1"/>
+                            <a:rPr lang="en-US" i="1">
+                              <a:latin typeface="Cambria Math" panose="02040503050406030204" pitchFamily="18" charset="0"/>
+                            </a:rPr>
                           </m:ctrlPr>
                         </m:sSubPr>
                         <m:e>
                           <m:r>
-                            <a:rPr lang="es-PE" i="1"/>
+                            <a:rPr lang="es-PE" i="1">
+                              <a:latin typeface="Cambria Math" panose="02040503050406030204" pitchFamily="18" charset="0"/>
+                            </a:rPr>
                             <m:t>𝛽</m:t>
                           </m:r>
                         </m:e>
                         <m:sub>
                           <m:r>
-                            <a:rPr lang="es-PE" i="1"/>
+                            <a:rPr lang="es-PE" i="1">
+                              <a:latin typeface="Cambria Math" panose="02040503050406030204" pitchFamily="18" charset="0"/>
+                            </a:rPr>
                             <m:t>2</m:t>
                           </m:r>
                         </m:sub>
@@ -27864,45 +28116,61 @@
                       <m:sSub>
                         <m:sSubPr>
                           <m:ctrlPr>
-                            <a:rPr lang="en-US" i="1"/>
+                            <a:rPr lang="en-US" i="1">
+                              <a:latin typeface="Cambria Math" panose="02040503050406030204" pitchFamily="18" charset="0"/>
+                            </a:rPr>
                           </m:ctrlPr>
                         </m:sSubPr>
                         <m:e>
                           <m:r>
-                            <a:rPr lang="es-PE" i="1"/>
+                            <a:rPr lang="es-PE" i="1">
+                              <a:latin typeface="Cambria Math" panose="02040503050406030204" pitchFamily="18" charset="0"/>
+                            </a:rPr>
                             <m:t>𝑍</m:t>
                           </m:r>
                         </m:e>
                         <m:sub>
                           <m:r>
-                            <a:rPr lang="es-PE" i="1"/>
+                            <a:rPr lang="es-PE" i="1">
+                              <a:latin typeface="Cambria Math" panose="02040503050406030204" pitchFamily="18" charset="0"/>
+                            </a:rPr>
                             <m:t>𝑏</m:t>
                           </m:r>
                         </m:sub>
                       </m:sSub>
                       <m:r>
-                        <a:rPr lang="es-PE" i="1"/>
+                        <a:rPr lang="es-PE" i="1">
+                          <a:latin typeface="Cambria Math" panose="02040503050406030204" pitchFamily="18" charset="0"/>
+                        </a:rPr>
                         <m:t>+</m:t>
                       </m:r>
                       <m:r>
-                        <a:rPr lang="es-PE" i="1"/>
+                        <a:rPr lang="es-PE" i="1">
+                          <a:latin typeface="Cambria Math" panose="02040503050406030204" pitchFamily="18" charset="0"/>
+                        </a:rPr>
                         <m:t>𝜌</m:t>
                       </m:r>
                       <m:sSub>
                         <m:sSubPr>
                           <m:ctrlPr>
-                            <a:rPr lang="en-US" i="1"/>
+                            <a:rPr lang="en-US" i="1">
+                              <a:latin typeface="Cambria Math" panose="02040503050406030204" pitchFamily="18" charset="0"/>
+                            </a:rPr>
                           </m:ctrlPr>
                         </m:sSubPr>
                         <m:e>
                           <m:r>
-                            <a:rPr lang="es-PE" i="1"/>
+                            <a:rPr lang="es-PE" i="1">
+                              <a:latin typeface="Cambria Math" panose="02040503050406030204" pitchFamily="18" charset="0"/>
+                            </a:rPr>
                             <m:t>𝑃</m:t>
                           </m:r>
                         </m:e>
                         <m:sub>
                           <m:r>
-                            <a:rPr lang="es-PE" i="1"/>
+                            <a:rPr lang="es-PE" i="1">
+                              <a:latin typeface="Cambria Math" panose="02040503050406030204" pitchFamily="18" charset="0"/>
+                            </a:rPr>
                             <m:t>𝑎</m:t>
                           </m:r>
                         </m:sub>
@@ -27925,7 +28193,7 @@
             </p:txBody>
           </p:sp>
         </mc:Choice>
-        <mc:Fallback>
+        <mc:Fallback xmlns="">
           <p:sp>
             <p:nvSpPr>
               <p:cNvPr id="17" name="CuadroTexto 16"/>

</xml_diff>